<commit_message>
Minor updates in presentation
</commit_message>
<xml_diff>
--- a/introR4AuditoryScience.pptx
+++ b/introR4AuditoryScience.pptx
@@ -8241,7 +8241,7 @@
                 <a:latin typeface="+mn-lt"/>
                 <a:ea typeface="ＭＳ Ｐゴシック" pitchFamily="-80" charset="-128"/>
               </a:rPr>
-              <a:t>27 May 2020</a:t>
+              <a:t>08 June 2020</a:t>
             </a:r>
           </a:p>
         </p:txBody>
@@ -13532,27 +13532,27 @@
 </file>
 
 <file path=customXml/item2.xml><?xml version="1.0" encoding="utf-8"?>
+<TemplafySlideTemplateConfiguration><![CDATA[{"documentContentValidatorConfiguration":{"enableDocumentContentValidator":false,"documentContentValidatorVersion":0},"elementsMetadata":[],"slideId":"636957680393408391","enableDocumentContentUpdater":true,"version":"1.2"}]]></TemplafySlideTemplateConfiguration>
+</file>
+
+<file path=customXml/item3.xml><?xml version="1.0" encoding="utf-8"?>
 <TemplafySlideTemplateConfiguration><![CDATA[{"documentContentValidatorConfiguration":{"enableDocumentContentValidator":false,"documentContentValidatorVersion":0},"elementsMetadata":[],"slideId":"636957680393236694","enableDocumentContentUpdater":true,"version":"1.2"}]]></TemplafySlideTemplateConfiguration>
 </file>
 
-<file path=customXml/item3.xml><?xml version="1.0" encoding="utf-8"?>
+<file path=customXml/item4.xml><?xml version="1.0" encoding="utf-8"?>
 <TemplafySlideFormConfiguration><![CDATA[{"formFields":[],"formDataEntries":[]}]]></TemplafySlideFormConfiguration>
 </file>
 
-<file path=customXml/item4.xml><?xml version="1.0" encoding="utf-8"?>
-<TemplafyTemplateConfiguration><![CDATA[{"elementsMetadata":[{"type":"shape","id":"238e85ed-56d9-4209-b9b6-b7c3689037c5","elementConfiguration":{"binding":"UserProfile.Offices.Workarea_{{DocumentLanguage}}","disableUpdates":false,"type":"text"}},{"type":"shape","id":"5b015a88-a4c9-4fa4-8ef1-47ac79f9e425","elementConfiguration":{"format":"{{DateFormats.GeneralDate}}","binding":"Form.Date","disableUpdates":false,"type":"date"}},{"type":"shape","id":"1ba720e6-1107-4dfa-a983-ea2ed7497a5b","elementConfiguration":{"binding":"Form.PresentationTitle","disableUpdates":false,"type":"text"}}],"transformationConfigurations":[{"language":"{{DocumentLanguage}}","disableUpdates":false,"type":"proofingLanguage"}],"templateName":"DTU Template 16_9 - Corporate red","templateDescription":"","enableDocumentContentUpdater":true,"version":"1.2"}]]></TemplafyTemplateConfiguration>
+<file path=customXml/item5.xml><?xml version="1.0" encoding="utf-8"?>
+<TemplafySlideTemplateConfiguration><![CDATA[{"documentContentValidatorConfiguration":{"enableDocumentContentValidator":false,"documentContentValidatorVersion":0},"elementsMetadata":[],"slideId":"636957680393408390","enableDocumentContentUpdater":true,"version":"1.2"}]]></TemplafySlideTemplateConfiguration>
 </file>
 
-<file path=customXml/item5.xml><?xml version="1.0" encoding="utf-8"?>
+<file path=customXml/item6.xml><?xml version="1.0" encoding="utf-8"?>
 <TemplafyFormConfiguration><![CDATA[{"formFields":[{"required":false,"type":"datePicker","name":"Date","label":"Date","helpTexts":{"prefix":"","postfix":""},"spacing":{},"fullyQualifiedName":"Date"},{"required":false,"placeholder":"","lines":0,"type":"textBox","name":"PresentationTitle","label":"Presentation title","helpTexts":{"prefix":"","postfix":""},"spacing":{},"fullyQualifiedName":"PresentationTitle"}],"formDataEntries":[{"name":"Date","value":"VHGb/aKS5bLLeyNSabD1TA=="},{"name":"PresentationTitle","value":"szVm1VP7wCT0Z6/+RlLQ4Q=="}]}]]></TemplafyFormConfiguration>
 </file>
 
-<file path=customXml/item6.xml><?xml version="1.0" encoding="utf-8"?>
-<TemplafySlideTemplateConfiguration><![CDATA[{"documentContentValidatorConfiguration":{"enableDocumentContentValidator":false,"documentContentValidatorVersion":0},"elementsMetadata":[],"slideId":"636957680393408390","enableDocumentContentUpdater":true,"version":"1.2"}]]></TemplafySlideTemplateConfiguration>
-</file>
-
 <file path=customXml/item7.xml><?xml version="1.0" encoding="utf-8"?>
-<TemplafySlideTemplateConfiguration><![CDATA[{"documentContentValidatorConfiguration":{"enableDocumentContentValidator":false,"documentContentValidatorVersion":0},"elementsMetadata":[],"slideId":"636957680393408391","enableDocumentContentUpdater":true,"version":"1.2"}]]></TemplafySlideTemplateConfiguration>
+<TemplafyTemplateConfiguration><![CDATA[{"elementsMetadata":[{"type":"shape","id":"238e85ed-56d9-4209-b9b6-b7c3689037c5","elementConfiguration":{"binding":"UserProfile.Offices.Workarea_{{DocumentLanguage}}","disableUpdates":false,"type":"text"}},{"type":"shape","id":"5b015a88-a4c9-4fa4-8ef1-47ac79f9e425","elementConfiguration":{"format":"{{DateFormats.GeneralDate}}","binding":"Form.Date","disableUpdates":false,"type":"date"}},{"type":"shape","id":"1ba720e6-1107-4dfa-a983-ea2ed7497a5b","elementConfiguration":{"binding":"Form.PresentationTitle","disableUpdates":false,"type":"text"}}],"transformationConfigurations":[{"language":"{{DocumentLanguage}}","disableUpdates":false,"type":"proofingLanguage"}],"templateName":"DTU Template 16_9 - Corporate red","templateDescription":"","enableDocumentContentUpdater":true,"version":"1.2"}]]></TemplafyTemplateConfiguration>
 </file>
 
 <file path=customXml/item8.xml><?xml version="1.0" encoding="utf-8"?>
@@ -13560,43 +13560,43 @@
 </file>
 
 <file path=customXml/itemProps1.xml><?xml version="1.0" encoding="utf-8"?>
+<ds:datastoreItem xmlns:ds="http://schemas.openxmlformats.org/officeDocument/2006/customXml" ds:itemID="{9587AFF5-BFB0-40A3-85CA-ADEED7540807}">
+  <ds:schemaRefs/>
+</ds:datastoreItem>
+</file>
+
+<file path=customXml/itemProps2.xml><?xml version="1.0" encoding="utf-8"?>
+<ds:datastoreItem xmlns:ds="http://schemas.openxmlformats.org/officeDocument/2006/customXml" ds:itemID="{CA9FC985-930B-40D4-827F-9FAC5D35EA8C}">
+  <ds:schemaRefs/>
+</ds:datastoreItem>
+</file>
+
+<file path=customXml/itemProps3.xml><?xml version="1.0" encoding="utf-8"?>
+<ds:datastoreItem xmlns:ds="http://schemas.openxmlformats.org/officeDocument/2006/customXml" ds:itemID="{D27AE696-61B6-4B19-9CED-6F2A3F244FE3}">
+  <ds:schemaRefs/>
+</ds:datastoreItem>
+</file>
+
+<file path=customXml/itemProps4.xml><?xml version="1.0" encoding="utf-8"?>
 <ds:datastoreItem xmlns:ds="http://schemas.openxmlformats.org/officeDocument/2006/customXml" ds:itemID="{5DEE4BEE-00BA-4E32-BD26-AF535B50AC95}">
   <ds:schemaRefs/>
 </ds:datastoreItem>
 </file>
 
-<file path=customXml/itemProps2.xml><?xml version="1.0" encoding="utf-8"?>
-<ds:datastoreItem xmlns:ds="http://schemas.openxmlformats.org/officeDocument/2006/customXml" ds:itemID="{D27AE696-61B6-4B19-9CED-6F2A3F244FE3}">
+<file path=customXml/itemProps5.xml><?xml version="1.0" encoding="utf-8"?>
+<ds:datastoreItem xmlns:ds="http://schemas.openxmlformats.org/officeDocument/2006/customXml" ds:itemID="{6B8AD017-B053-4E30-93B9-B28A44CEC3A4}">
   <ds:schemaRefs/>
 </ds:datastoreItem>
 </file>
 
-<file path=customXml/itemProps3.xml><?xml version="1.0" encoding="utf-8"?>
-<ds:datastoreItem xmlns:ds="http://schemas.openxmlformats.org/officeDocument/2006/customXml" ds:itemID="{9587AFF5-BFB0-40A3-85CA-ADEED7540807}">
-  <ds:schemaRefs/>
-</ds:datastoreItem>
-</file>
-
-<file path=customXml/itemProps4.xml><?xml version="1.0" encoding="utf-8"?>
-<ds:datastoreItem xmlns:ds="http://schemas.openxmlformats.org/officeDocument/2006/customXml" ds:itemID="{1334258C-C3E7-4029-A615-C886A240FB15}">
-  <ds:schemaRefs/>
-</ds:datastoreItem>
-</file>
-
-<file path=customXml/itemProps5.xml><?xml version="1.0" encoding="utf-8"?>
+<file path=customXml/itemProps6.xml><?xml version="1.0" encoding="utf-8"?>
 <ds:datastoreItem xmlns:ds="http://schemas.openxmlformats.org/officeDocument/2006/customXml" ds:itemID="{43763224-B85A-4B53-A86A-261D26A71C30}">
   <ds:schemaRefs/>
 </ds:datastoreItem>
 </file>
 
-<file path=customXml/itemProps6.xml><?xml version="1.0" encoding="utf-8"?>
-<ds:datastoreItem xmlns:ds="http://schemas.openxmlformats.org/officeDocument/2006/customXml" ds:itemID="{6B8AD017-B053-4E30-93B9-B28A44CEC3A4}">
-  <ds:schemaRefs/>
-</ds:datastoreItem>
-</file>
-
 <file path=customXml/itemProps7.xml><?xml version="1.0" encoding="utf-8"?>
-<ds:datastoreItem xmlns:ds="http://schemas.openxmlformats.org/officeDocument/2006/customXml" ds:itemID="{CA9FC985-930B-40D4-827F-9FAC5D35EA8C}">
+<ds:datastoreItem xmlns:ds="http://schemas.openxmlformats.org/officeDocument/2006/customXml" ds:itemID="{1334258C-C3E7-4029-A615-C886A240FB15}">
   <ds:schemaRefs/>
 </ds:datastoreItem>
 </file>

</xml_diff>